<commit_message>
Removed filename from CDS component since it's being created on the fly
</commit_message>
<xml_diff>
--- a/CodeRageX - RTL Deep Dive - John Kaster.pptx
+++ b/CodeRageX - RTL Deep Dive - John Kaster.pptx
@@ -5,7 +5,7 @@
     <p:sldMasterId id="2147483648" r:id="rId4"/>
   </p:sldMasterIdLst>
   <p:notesMasterIdLst>
-    <p:notesMasterId r:id="rId42"/>
+    <p:notesMasterId r:id="rId43"/>
   </p:notesMasterIdLst>
   <p:sldIdLst>
     <p:sldId id="262" r:id="rId5"/>
@@ -43,8 +43,9 @@
     <p:sldId id="295" r:id="rId37"/>
     <p:sldId id="296" r:id="rId38"/>
     <p:sldId id="297" r:id="rId39"/>
-    <p:sldId id="290" r:id="rId40"/>
-    <p:sldId id="298" r:id="rId41"/>
+    <p:sldId id="299" r:id="rId40"/>
+    <p:sldId id="290" r:id="rId41"/>
+    <p:sldId id="298" r:id="rId42"/>
   </p:sldIdLst>
   <p:sldSz cx="9144000" cy="5143500" type="screen16x9"/>
   <p:notesSz cx="6858000" cy="9144000"/>
@@ -145,7 +146,7 @@
   </p:defaultTextStyle>
   <p:extLst>
     <p:ext uri="{EFAFB233-063F-42B5-8137-9DF3F51BA10A}">
-      <p15:sldGuideLst xmlns:p15="http://schemas.microsoft.com/office/powerpoint/2012/main" xmlns="">
+      <p15:sldGuideLst xmlns="" xmlns:p15="http://schemas.microsoft.com/office/powerpoint/2012/main">
         <p15:guide id="1" orient="horz" pos="1580">
           <p15:clr>
             <a:srgbClr val="A4A3A4"/>
@@ -245,7 +246,7 @@
             <a:fld id="{6FFC9D4C-EFD5-4E16-9FD5-B6297126F1AC}" type="datetimeFigureOut">
               <a:rPr lang="en-US" smtClean="0"/>
               <a:pPr/>
-              <a:t>10/8/2015</a:t>
+              <a:t>10/12/2015</a:t>
             </a:fld>
             <a:endParaRPr lang="en-US"/>
           </a:p>
@@ -416,7 +417,7 @@
     </p:spTree>
     <p:extLst>
       <p:ext uri="{BB962C8B-B14F-4D97-AF65-F5344CB8AC3E}">
-        <p14:creationId xmlns="" xmlns:p14="http://schemas.microsoft.com/office/powerpoint/2010/main" val="1698219620"/>
+        <p14:creationId xmlns:p14="http://schemas.microsoft.com/office/powerpoint/2010/main" xmlns="" val="1698219620"/>
       </p:ext>
     </p:extLst>
   </p:cSld>
@@ -2962,7 +2963,7 @@
             <a:fld id="{E61E7B05-F66F-41CE-9A86-B93D755B0A6C}" type="slidenum">
               <a:rPr lang="en-US" smtClean="0"/>
               <a:pPr/>
-              <a:t>36</a:t>
+              <a:t>37</a:t>
             </a:fld>
             <a:endParaRPr lang="en-US"/>
           </a:p>
@@ -3044,7 +3045,7 @@
             <a:fld id="{E61E7B05-F66F-41CE-9A86-B93D755B0A6C}" type="slidenum">
               <a:rPr lang="en-US" smtClean="0"/>
               <a:pPr/>
-              <a:t>37</a:t>
+              <a:t>38</a:t>
             </a:fld>
             <a:endParaRPr lang="en-US"/>
           </a:p>
@@ -3579,7 +3580,7 @@
           <a:blip r:embed="rId2" cstate="print">
             <a:extLst>
               <a:ext uri="{28A0092B-C50C-407E-A947-70E740481C1C}">
-                <a14:useLocalDpi xmlns="" xmlns:a14="http://schemas.microsoft.com/office/drawing/2010/main" val="0"/>
+                <a14:useLocalDpi xmlns:a14="http://schemas.microsoft.com/office/drawing/2010/main" xmlns="" val="0"/>
               </a:ext>
             </a:extLst>
           </a:blip>
@@ -3916,7 +3917,7 @@
     </p:spTree>
     <p:extLst>
       <p:ext uri="{BB962C8B-B14F-4D97-AF65-F5344CB8AC3E}">
-        <p14:creationId xmlns="" xmlns:p14="http://schemas.microsoft.com/office/powerpoint/2010/main" val="3344159704"/>
+        <p14:creationId xmlns:p14="http://schemas.microsoft.com/office/powerpoint/2010/main" xmlns="" val="3344159704"/>
       </p:ext>
     </p:extLst>
   </p:cSld>
@@ -4957,7 +4958,7 @@
           <a:blip r:embed="rId8" cstate="print">
             <a:extLst>
               <a:ext uri="{28A0092B-C50C-407E-A947-70E740481C1C}">
-                <a14:useLocalDpi xmlns="" xmlns:a14="http://schemas.microsoft.com/office/drawing/2010/main" val="0"/>
+                <a14:useLocalDpi xmlns:a14="http://schemas.microsoft.com/office/drawing/2010/main" xmlns="" val="0"/>
               </a:ext>
             </a:extLst>
           </a:blip>
@@ -5441,7 +5442,7 @@
     </p:spTree>
     <p:extLst>
       <p:ext uri="{BB962C8B-B14F-4D97-AF65-F5344CB8AC3E}">
-        <p14:creationId xmlns="" xmlns:p14="http://schemas.microsoft.com/office/powerpoint/2010/main" val="183866746"/>
+        <p14:creationId xmlns:p14="http://schemas.microsoft.com/office/powerpoint/2010/main" xmlns="" val="183866746"/>
       </p:ext>
     </p:extLst>
   </p:cSld>
@@ -8259,18 +8260,7 @@
                 <a:ea typeface="+mn-ea"/>
                 <a:cs typeface="Segoe"/>
               </a:rPr>
-              <a:t>What’s new in RAD Studio 10 Seattle </a:t>
-            </a:r>
-            <a:r>
-              <a:rPr lang="en-US" sz="1600" b="0" i="0" kern="1200" dirty="0" smtClean="0">
-                <a:solidFill>
-                  <a:schemeClr val="tx1"/>
-                </a:solidFill>
-                <a:latin typeface="Segoe"/>
-                <a:ea typeface="+mn-ea"/>
-                <a:cs typeface="Segoe"/>
-              </a:rPr>
-              <a:t>Webinar</a:t>
+              <a:t>What’s new in RAD Studio 10 Seattle Webinar</a:t>
             </a:r>
           </a:p>
           <a:p>
@@ -8331,7 +8321,7 @@
     </p:spTree>
     <p:extLst>
       <p:ext uri="{BB962C8B-B14F-4D97-AF65-F5344CB8AC3E}">
-        <p14:creationId xmlns="" xmlns:p14="http://schemas.microsoft.com/office/powerpoint/2010/main" val="218323976"/>
+        <p14:creationId xmlns:p14="http://schemas.microsoft.com/office/powerpoint/2010/main" xmlns="" val="218323976"/>
       </p:ext>
     </p:extLst>
   </p:cSld>
@@ -9063,15 +9053,7 @@
             </a:r>
             <a:r>
               <a:rPr lang="en-US" dirty="0" smtClean="0"/>
-              <a:t> and Darren’s </a:t>
-            </a:r>
-            <a:r>
-              <a:rPr lang="en-US" dirty="0" smtClean="0"/>
-              <a:t>sessions</a:t>
-            </a:r>
-            <a:r>
-              <a:rPr lang="en-US" dirty="0" smtClean="0"/>
-              <a:t>!</a:t>
+              <a:t> and Darren’s sessions!</a:t>
             </a:r>
           </a:p>
           <a:p>
@@ -12046,9 +12028,12 @@
             </a:r>
             <a:r>
               <a:rPr lang="en-US" baseline="0" dirty="0" smtClean="0"/>
-              <a:t> for activity indicators</a:t>
-            </a:r>
-            <a:endParaRPr lang="en-US" dirty="0"/>
+              <a:t> for activity </a:t>
+            </a:r>
+            <a:r>
+              <a:rPr lang="en-US" baseline="0" dirty="0" smtClean="0"/>
+              <a:t>indicators</a:t>
+            </a:r>
           </a:p>
         </p:txBody>
       </p:sp>
@@ -12125,7 +12110,7 @@
           <a:p>
             <a:r>
               <a:rPr lang="en-US" dirty="0" smtClean="0"/>
-              <a:t>Thanks</a:t>
+              <a:t>Demo</a:t>
             </a:r>
             <a:endParaRPr lang="en-US" dirty="0"/>
           </a:p>
@@ -12143,183 +12128,61 @@
         </p:nvSpPr>
         <p:spPr/>
         <p:txBody>
-          <a:bodyPr>
-            <a:normAutofit lnSpcReduction="10000"/>
-          </a:bodyPr>
-          <a:lstStyle/>
-          <a:p>
-            <a:pPr rtl="0" eaLnBrk="1" latinLnBrk="0" hangingPunct="1"/>
-            <a:r>
-              <a:rPr lang="en-US" sz="1600" b="0" i="0" kern="1200" dirty="0" smtClean="0">
-                <a:solidFill>
-                  <a:schemeClr val="tx1"/>
-                </a:solidFill>
-                <a:latin typeface="Segoe"/>
-                <a:ea typeface="+mn-ea"/>
-                <a:cs typeface="Segoe"/>
+          <a:bodyPr/>
+          <a:lstStyle/>
+          <a:p>
+            <a:r>
+              <a:rPr lang="en-US" dirty="0" err="1" smtClean="0"/>
+              <a:t>TDataSet.FindField</a:t>
+            </a:r>
+            <a:r>
+              <a:rPr lang="en-US" dirty="0" smtClean="0"/>
+              <a:t>() conversion to Dictionary lookup from list iteration</a:t>
+            </a:r>
+          </a:p>
+          <a:p>
+            <a:pPr lvl="1"/>
+            <a:r>
+              <a:rPr lang="en-US" dirty="0" smtClean="0"/>
+              <a:t>Find an existing field name</a:t>
+            </a:r>
+          </a:p>
+          <a:p>
+            <a:pPr lvl="1"/>
+            <a:r>
+              <a:rPr lang="en-US" dirty="0" smtClean="0"/>
+              <a:t>Look for a missing field name</a:t>
+            </a:r>
+          </a:p>
+          <a:p>
+            <a:pPr lvl="1"/>
+            <a:r>
+              <a:rPr lang="en-US" dirty="0" smtClean="0"/>
+              <a:t>Take timings for XE8 and DXS</a:t>
+            </a:r>
+          </a:p>
+          <a:p>
+            <a:pPr marL="342900" lvl="1" indent="-342900">
+              <a:buFont typeface="Arial" pitchFamily="34" charset="0"/>
+              <a:buChar char="•"/>
+            </a:pPr>
+            <a:r>
+              <a:rPr lang="en-US" dirty="0" smtClean="0"/>
+              <a:t>Source code is at </a:t>
+            </a:r>
+            <a:r>
+              <a:rPr lang="en-US" dirty="0" smtClean="0">
+                <a:hlinkClick r:id="rId2"/>
               </a:rPr>
-              <a:t>Thanks for attending!</a:t>
-            </a:r>
-          </a:p>
-          <a:p>
-            <a:pPr rtl="0" eaLnBrk="1" latinLnBrk="0" hangingPunct="1"/>
-            <a:r>
-              <a:rPr lang="en-US" sz="1600" b="0" i="0" kern="1200" dirty="0" smtClean="0">
-                <a:solidFill>
-                  <a:schemeClr val="tx1"/>
-                </a:solidFill>
-                <a:latin typeface="Segoe"/>
-                <a:ea typeface="+mn-ea"/>
-                <a:cs typeface="Segoe"/>
-              </a:rPr>
-              <a:t>Sources</a:t>
-            </a:r>
-          </a:p>
-          <a:p>
-            <a:pPr lvl="1" rtl="0" eaLnBrk="1" latinLnBrk="0" hangingPunct="1"/>
-            <a:r>
-              <a:rPr lang="en-US" sz="1600" b="0" i="0" kern="1200" dirty="0" smtClean="0">
-                <a:solidFill>
-                  <a:schemeClr val="tx1"/>
-                </a:solidFill>
-                <a:latin typeface="Segoe"/>
-                <a:ea typeface="+mn-ea"/>
-                <a:cs typeface="Segoe"/>
-              </a:rPr>
-              <a:t>What's New </a:t>
-            </a:r>
-            <a:r>
-              <a:rPr lang="en-US" sz="1600" b="0" i="0" kern="1200" dirty="0" smtClean="0">
-                <a:solidFill>
-                  <a:schemeClr val="tx1"/>
-                </a:solidFill>
-                <a:latin typeface="Segoe"/>
-                <a:ea typeface="+mn-ea"/>
-                <a:cs typeface="Segoe"/>
-                <a:hlinkClick r:id="rId3"/>
-              </a:rPr>
-              <a:t>http://docwiki.embarcadero.com/RADStudio/Seattle/en/What%27s_New</a:t>
-            </a:r>
-            <a:endParaRPr lang="en-US" sz="1600" b="0" i="0" kern="1200" dirty="0" smtClean="0">
-              <a:solidFill>
-                <a:schemeClr val="tx1"/>
-              </a:solidFill>
-              <a:latin typeface="Segoe"/>
-              <a:ea typeface="+mn-ea"/>
-              <a:cs typeface="Segoe"/>
-            </a:endParaRPr>
-          </a:p>
-          <a:p>
-            <a:pPr lvl="1" rtl="0" eaLnBrk="1" latinLnBrk="0" hangingPunct="1"/>
-            <a:r>
-              <a:rPr lang="en-US" sz="1600" b="0" i="0" kern="1200" dirty="0" smtClean="0">
-                <a:solidFill>
-                  <a:schemeClr val="tx1"/>
-                </a:solidFill>
-                <a:latin typeface="Segoe"/>
-                <a:ea typeface="+mn-ea"/>
-                <a:cs typeface="Segoe"/>
-              </a:rPr>
-              <a:t>Release Notes </a:t>
-            </a:r>
-            <a:r>
-              <a:rPr lang="en-US" sz="1600" b="0" i="0" kern="1200" dirty="0" smtClean="0">
-                <a:solidFill>
-                  <a:schemeClr val="tx1"/>
-                </a:solidFill>
-                <a:latin typeface="Segoe"/>
-                <a:ea typeface="+mn-ea"/>
-                <a:cs typeface="Segoe"/>
-                <a:hlinkClick r:id="rId4"/>
-              </a:rPr>
-              <a:t>http://docwiki.embarcadero.com/RADStudio/Seattle/en/Release_Notes</a:t>
-            </a:r>
-            <a:endParaRPr lang="en-US" sz="1600" b="0" i="0" kern="1200" dirty="0" smtClean="0">
-              <a:solidFill>
-                <a:schemeClr val="tx1"/>
-              </a:solidFill>
-              <a:latin typeface="Segoe"/>
-              <a:ea typeface="+mn-ea"/>
-              <a:cs typeface="Segoe"/>
-            </a:endParaRPr>
-          </a:p>
-          <a:p>
-            <a:pPr lvl="1" rtl="0" eaLnBrk="1" latinLnBrk="0" hangingPunct="1"/>
-            <a:r>
-              <a:rPr lang="en-US" sz="1600" b="0" i="0" kern="1200" dirty="0" smtClean="0">
-                <a:solidFill>
-                  <a:schemeClr val="tx1"/>
-                </a:solidFill>
-                <a:latin typeface="Segoe"/>
-                <a:ea typeface="+mn-ea"/>
-                <a:cs typeface="Segoe"/>
-              </a:rPr>
-              <a:t>Bug fix list for RAD Studio 10 Seattle </a:t>
-            </a:r>
-            <a:r>
-              <a:rPr lang="en-US" sz="1600" b="0" i="0" kern="1200" dirty="0" smtClean="0">
-                <a:solidFill>
-                  <a:schemeClr val="tx1"/>
-                </a:solidFill>
-                <a:latin typeface="Segoe"/>
-                <a:ea typeface="+mn-ea"/>
-                <a:cs typeface="Segoe"/>
-                <a:hlinkClick r:id="rId5"/>
-              </a:rPr>
-              <a:t>http://edn.embarcadero.com/article/44561</a:t>
-            </a:r>
-            <a:endParaRPr lang="en-US" sz="1600" b="0" i="0" kern="1200" dirty="0" smtClean="0">
-              <a:solidFill>
-                <a:schemeClr val="tx1"/>
-              </a:solidFill>
-              <a:latin typeface="Segoe"/>
-              <a:ea typeface="+mn-ea"/>
-              <a:cs typeface="Segoe"/>
-            </a:endParaRPr>
-          </a:p>
-          <a:p>
-            <a:pPr lvl="1"/>
-            <a:r>
-              <a:rPr lang="en-US" dirty="0" smtClean="0"/>
-              <a:t>RAD Studio 10 Seattle Deep Dive </a:t>
-            </a:r>
-            <a:r>
-              <a:rPr lang="en-US" dirty="0" smtClean="0">
-                <a:hlinkClick r:id="rId6"/>
-              </a:rPr>
-              <a:t>https://www.youtube.com/playlist?list=PLwUPJvR9mZHi2Ks61dV5p-PEUf6Sml7eM</a:t>
-            </a:r>
-          </a:p>
-          <a:p>
-            <a:pPr marL="742950" marR="0" lvl="1" indent="-285750" algn="l" defTabSz="914400" rtl="0" eaLnBrk="1" fontAlgn="auto" latinLnBrk="0" hangingPunct="1">
-              <a:lnSpc>
-                <a:spcPct val="100000"/>
-              </a:lnSpc>
-              <a:spcBef>
-                <a:spcPct val="20000"/>
-              </a:spcBef>
-              <a:spcAft>
-                <a:spcPts val="0"/>
-              </a:spcAft>
-              <a:buClrTx/>
-              <a:buSzTx/>
-              <a:buFont typeface="Arial" pitchFamily="34" charset="0"/>
-              <a:buChar char="–"/>
-              <a:tabLst/>
-              <a:defRPr/>
+              <a:t>https://github.com/jkaster/RTLPerf</a:t>
+            </a:r>
+            <a:endParaRPr lang="en-US" dirty="0" smtClean="0"/>
+          </a:p>
+          <a:p>
+            <a:pPr>
+              <a:buNone/>
             </a:pPr>
-            <a:r>
-              <a:rPr lang="en-US" dirty="0" smtClean="0"/>
-              <a:t>Link to my notes will be provided during Q&amp;A</a:t>
-            </a:r>
-            <a:endParaRPr lang="en-US" sz="1600" b="0" i="0" kern="1200" dirty="0" smtClean="0">
-              <a:solidFill>
-                <a:schemeClr val="tx1"/>
-              </a:solidFill>
-              <a:latin typeface="Segoe"/>
-              <a:ea typeface="+mn-ea"/>
-              <a:cs typeface="Segoe"/>
-            </a:endParaRPr>
+            <a:endParaRPr lang="en-US" dirty="0"/>
           </a:p>
         </p:txBody>
       </p:sp>
@@ -12352,13 +12215,6 @@
   <p:clrMapOvr>
     <a:masterClrMapping/>
   </p:clrMapOvr>
-  <p:timing>
-    <p:tnLst>
-      <p:par>
-        <p:cTn id="1" dur="indefinite" restart="never" nodeType="tmRoot"/>
-      </p:par>
-    </p:tnLst>
-  </p:timing>
 </p:sld>
 </file>
 
@@ -12386,6 +12242,287 @@
             <a:spLocks noGrp="1"/>
           </p:cNvSpPr>
           <p:nvPr>
+            <p:ph type="title"/>
+          </p:nvPr>
+        </p:nvSpPr>
+        <p:spPr/>
+        <p:txBody>
+          <a:bodyPr/>
+          <a:lstStyle/>
+          <a:p>
+            <a:r>
+              <a:rPr lang="en-US" dirty="0" smtClean="0"/>
+              <a:t>Thanks</a:t>
+            </a:r>
+            <a:endParaRPr lang="en-US" dirty="0"/>
+          </a:p>
+        </p:txBody>
+      </p:sp>
+      <p:sp>
+        <p:nvSpPr>
+          <p:cNvPr id="3" name="Content Placeholder 2"/>
+          <p:cNvSpPr>
+            <a:spLocks noGrp="1"/>
+          </p:cNvSpPr>
+          <p:nvPr>
+            <p:ph idx="1"/>
+          </p:nvPr>
+        </p:nvSpPr>
+        <p:spPr/>
+        <p:txBody>
+          <a:bodyPr>
+            <a:normAutofit fontScale="92500"/>
+          </a:bodyPr>
+          <a:lstStyle/>
+          <a:p>
+            <a:pPr rtl="0" eaLnBrk="1" latinLnBrk="0" hangingPunct="1"/>
+            <a:r>
+              <a:rPr lang="en-US" sz="1600" b="0" i="0" kern="1200" dirty="0" smtClean="0">
+                <a:solidFill>
+                  <a:schemeClr val="tx1"/>
+                </a:solidFill>
+                <a:latin typeface="Segoe"/>
+                <a:ea typeface="+mn-ea"/>
+                <a:cs typeface="Segoe"/>
+              </a:rPr>
+              <a:t>Thanks for attending!</a:t>
+            </a:r>
+          </a:p>
+          <a:p>
+            <a:pPr rtl="0" eaLnBrk="1" latinLnBrk="0" hangingPunct="1"/>
+            <a:r>
+              <a:rPr lang="en-US" sz="1600" b="0" i="0" kern="1200" dirty="0" smtClean="0">
+                <a:solidFill>
+                  <a:schemeClr val="tx1"/>
+                </a:solidFill>
+                <a:latin typeface="Segoe"/>
+                <a:ea typeface="+mn-ea"/>
+                <a:cs typeface="Segoe"/>
+              </a:rPr>
+              <a:t>Sources</a:t>
+            </a:r>
+          </a:p>
+          <a:p>
+            <a:pPr lvl="1" rtl="0" eaLnBrk="1" latinLnBrk="0" hangingPunct="1"/>
+            <a:r>
+              <a:rPr lang="en-US" sz="1600" b="0" i="0" kern="1200" dirty="0" smtClean="0">
+                <a:solidFill>
+                  <a:schemeClr val="tx1"/>
+                </a:solidFill>
+                <a:latin typeface="Segoe"/>
+                <a:ea typeface="+mn-ea"/>
+                <a:cs typeface="Segoe"/>
+              </a:rPr>
+              <a:t>What's New </a:t>
+            </a:r>
+            <a:r>
+              <a:rPr lang="en-US" sz="1600" b="0" i="0" kern="1200" dirty="0" smtClean="0">
+                <a:solidFill>
+                  <a:schemeClr val="tx1"/>
+                </a:solidFill>
+                <a:latin typeface="Segoe"/>
+                <a:ea typeface="+mn-ea"/>
+                <a:cs typeface="Segoe"/>
+                <a:hlinkClick r:id="rId3"/>
+              </a:rPr>
+              <a:t>http://docwiki.embarcadero.com/RADStudio/Seattle/en/What%27s_New</a:t>
+            </a:r>
+            <a:endParaRPr lang="en-US" sz="1600" b="0" i="0" kern="1200" dirty="0" smtClean="0">
+              <a:solidFill>
+                <a:schemeClr val="tx1"/>
+              </a:solidFill>
+              <a:latin typeface="Segoe"/>
+              <a:ea typeface="+mn-ea"/>
+              <a:cs typeface="Segoe"/>
+            </a:endParaRPr>
+          </a:p>
+          <a:p>
+            <a:pPr lvl="1" rtl="0" eaLnBrk="1" latinLnBrk="0" hangingPunct="1"/>
+            <a:r>
+              <a:rPr lang="en-US" sz="1600" b="0" i="0" kern="1200" dirty="0" smtClean="0">
+                <a:solidFill>
+                  <a:schemeClr val="tx1"/>
+                </a:solidFill>
+                <a:latin typeface="Segoe"/>
+                <a:ea typeface="+mn-ea"/>
+                <a:cs typeface="Segoe"/>
+              </a:rPr>
+              <a:t>Release Notes </a:t>
+            </a:r>
+            <a:r>
+              <a:rPr lang="en-US" sz="1600" b="0" i="0" kern="1200" dirty="0" smtClean="0">
+                <a:solidFill>
+                  <a:schemeClr val="tx1"/>
+                </a:solidFill>
+                <a:latin typeface="Segoe"/>
+                <a:ea typeface="+mn-ea"/>
+                <a:cs typeface="Segoe"/>
+                <a:hlinkClick r:id="rId4"/>
+              </a:rPr>
+              <a:t>http://docwiki.embarcadero.com/RADStudio/Seattle/en/Release_Notes</a:t>
+            </a:r>
+            <a:endParaRPr lang="en-US" sz="1600" b="0" i="0" kern="1200" dirty="0" smtClean="0">
+              <a:solidFill>
+                <a:schemeClr val="tx1"/>
+              </a:solidFill>
+              <a:latin typeface="Segoe"/>
+              <a:ea typeface="+mn-ea"/>
+              <a:cs typeface="Segoe"/>
+            </a:endParaRPr>
+          </a:p>
+          <a:p>
+            <a:pPr lvl="1" rtl="0" eaLnBrk="1" latinLnBrk="0" hangingPunct="1"/>
+            <a:r>
+              <a:rPr lang="en-US" sz="1600" b="0" i="0" kern="1200" dirty="0" smtClean="0">
+                <a:solidFill>
+                  <a:schemeClr val="tx1"/>
+                </a:solidFill>
+                <a:latin typeface="Segoe"/>
+                <a:ea typeface="+mn-ea"/>
+                <a:cs typeface="Segoe"/>
+              </a:rPr>
+              <a:t>Bug fix list for RAD Studio 10 Seattle </a:t>
+            </a:r>
+            <a:r>
+              <a:rPr lang="en-US" sz="1600" b="0" i="0" kern="1200" dirty="0" smtClean="0">
+                <a:solidFill>
+                  <a:schemeClr val="tx1"/>
+                </a:solidFill>
+                <a:latin typeface="Segoe"/>
+                <a:ea typeface="+mn-ea"/>
+                <a:cs typeface="Segoe"/>
+                <a:hlinkClick r:id="rId5"/>
+              </a:rPr>
+              <a:t>http://edn.embarcadero.com/article/44561</a:t>
+            </a:r>
+            <a:endParaRPr lang="en-US" sz="1600" b="0" i="0" kern="1200" dirty="0" smtClean="0">
+              <a:solidFill>
+                <a:schemeClr val="tx1"/>
+              </a:solidFill>
+              <a:latin typeface="Segoe"/>
+              <a:ea typeface="+mn-ea"/>
+              <a:cs typeface="Segoe"/>
+            </a:endParaRPr>
+          </a:p>
+          <a:p>
+            <a:pPr lvl="1"/>
+            <a:r>
+              <a:rPr lang="en-US" dirty="0" smtClean="0"/>
+              <a:t>RAD Studio 10 Seattle Deep Dive </a:t>
+            </a:r>
+            <a:r>
+              <a:rPr lang="en-US" dirty="0" smtClean="0">
+                <a:hlinkClick r:id="rId6"/>
+              </a:rPr>
+              <a:t>https://www.youtube.com/playlist?list=PLwUPJvR9mZHi2Ks61dV5p-PEUf6Sml7eM</a:t>
+            </a:r>
+          </a:p>
+          <a:p>
+            <a:pPr lvl="1">
+              <a:defRPr/>
+            </a:pPr>
+            <a:r>
+              <a:rPr lang="en-US" dirty="0" smtClean="0"/>
+              <a:t>Go to </a:t>
+            </a:r>
+            <a:r>
+              <a:rPr lang="en-US" dirty="0" smtClean="0">
+                <a:hlinkClick r:id="rId7"/>
+              </a:rPr>
+              <a:t>https://</a:t>
+            </a:r>
+            <a:r>
+              <a:rPr lang="en-US" dirty="0" smtClean="0">
+                <a:hlinkClick r:id="rId7"/>
+              </a:rPr>
+              <a:t>github.com/jkaster/RTLPerf</a:t>
+            </a:r>
+            <a:r>
+              <a:rPr lang="en-US" dirty="0" smtClean="0"/>
+              <a:t> for </a:t>
+            </a:r>
+            <a:r>
+              <a:rPr lang="en-US" dirty="0" smtClean="0"/>
+              <a:t>n</a:t>
+            </a:r>
+            <a:r>
+              <a:rPr lang="en-US" dirty="0" smtClean="0"/>
+              <a:t>otes, slides, and performance test app</a:t>
+            </a:r>
+            <a:endParaRPr lang="en-US" sz="1600" b="0" i="0" kern="1200" dirty="0" smtClean="0">
+              <a:solidFill>
+                <a:schemeClr val="tx1"/>
+              </a:solidFill>
+              <a:latin typeface="Segoe"/>
+              <a:ea typeface="+mn-ea"/>
+              <a:cs typeface="Segoe"/>
+            </a:endParaRPr>
+          </a:p>
+        </p:txBody>
+      </p:sp>
+      <p:sp>
+        <p:nvSpPr>
+          <p:cNvPr id="4" name="Slide Number Placeholder 3"/>
+          <p:cNvSpPr>
+            <a:spLocks noGrp="1"/>
+          </p:cNvSpPr>
+          <p:nvPr>
+            <p:ph type="sldNum" sz="quarter" idx="12"/>
+          </p:nvPr>
+        </p:nvSpPr>
+        <p:spPr/>
+        <p:txBody>
+          <a:bodyPr/>
+          <a:lstStyle/>
+          <a:p>
+            <a:fld id="{A4B9D86F-0E15-46C6-88AE-086E78885E3D}" type="slidenum">
+              <a:rPr lang="en-US" smtClean="0"/>
+              <a:pPr/>
+              <a:t>37</a:t>
+            </a:fld>
+            <a:endParaRPr lang="en-US"/>
+          </a:p>
+        </p:txBody>
+      </p:sp>
+    </p:spTree>
+  </p:cSld>
+  <p:clrMapOvr>
+    <a:masterClrMapping/>
+  </p:clrMapOvr>
+  <p:timing>
+    <p:tnLst>
+      <p:par>
+        <p:cTn id="1" dur="indefinite" restart="never" nodeType="tmRoot"/>
+      </p:par>
+    </p:tnLst>
+  </p:timing>
+</p:sld>
+</file>
+
+<file path=ppt/slides/slide38.xml><?xml version="1.0" encoding="utf-8"?>
+<p:sld xmlns:a="http://schemas.openxmlformats.org/drawingml/2006/main" xmlns:r="http://schemas.openxmlformats.org/officeDocument/2006/relationships" xmlns:p="http://schemas.openxmlformats.org/presentationml/2006/main">
+  <p:cSld>
+    <p:spTree>
+      <p:nvGrpSpPr>
+        <p:cNvPr id="1" name=""/>
+        <p:cNvGrpSpPr/>
+        <p:nvPr/>
+      </p:nvGrpSpPr>
+      <p:grpSpPr>
+        <a:xfrm>
+          <a:off x="0" y="0"/>
+          <a:ext cx="0" cy="0"/>
+          <a:chOff x="0" y="0"/>
+          <a:chExt cx="0" cy="0"/>
+        </a:xfrm>
+      </p:grpSpPr>
+      <p:sp>
+        <p:nvSpPr>
+          <p:cNvPr id="2" name="Title 1"/>
+          <p:cNvSpPr>
+            <a:spLocks noGrp="1"/>
+          </p:cNvSpPr>
+          <p:nvPr>
             <p:ph type="ctrTitle"/>
           </p:nvPr>
         </p:nvSpPr>
@@ -12444,7 +12581,7 @@
             <a:fld id="{A4B9D86F-0E15-46C6-88AE-086E78885E3D}" type="slidenum">
               <a:rPr lang="en-US" smtClean="0"/>
               <a:pPr/>
-              <a:t>37</a:t>
+              <a:t>38</a:t>
             </a:fld>
             <a:endParaRPr lang="en-US"/>
           </a:p>
@@ -14299,6 +14436,27 @@
 </file>
 
 <file path=customXml/item1.xml><?xml version="1.0" encoding="utf-8"?>
+<?mso-contentType ?>
+<FormTemplates xmlns="http://schemas.microsoft.com/sharepoint/v3/contenttype/forms">
+  <Display>DocumentLibraryForm</Display>
+  <Edit>DocumentLibraryForm</Edit>
+  <New>DocumentLibraryForm</New>
+</FormTemplates>
+</file>
+
+<file path=customXml/item2.xml><?xml version="1.0" encoding="utf-8"?>
+<p:properties xmlns:p="http://schemas.microsoft.com/office/2006/metadata/properties" xmlns:xsi="http://www.w3.org/2001/XMLSchema-instance" xmlns:pc="http://schemas.microsoft.com/office/infopath/2007/PartnerControls">
+  <documentManagement>
+    <Year xmlns="f62b9ad8-a28f-4257-b39c-24ee014a67bd">2014</Year>
+    <Product xmlns="f62b9ad8-a28f-4257-b39c-24ee014a67bd" xsi:nil="true"/>
+    <Release xmlns="f62b9ad8-a28f-4257-b39c-24ee014a67bd" xsi:nil="true"/>
+    <Family xmlns="f62b9ad8-a28f-4257-b39c-24ee014a67bd" xsi:nil="true"/>
+    <Doc_x0020_Type xmlns="f62b9ad8-a28f-4257-b39c-24ee014a67bd" xsi:nil="true"/>
+  </documentManagement>
+</p:properties>
+</file>
+
+<file path=customXml/item3.xml><?xml version="1.0" encoding="utf-8"?>
 <ct:contentTypeSchema xmlns:ct="http://schemas.microsoft.com/office/2006/metadata/contentType" xmlns:ma="http://schemas.microsoft.com/office/2006/metadata/properties/metaAttributes" ct:_="" ma:_="" ma:contentTypeName="Document" ma:contentTypeID="0x0101007E0DEC3B9574B6409DD98AC7B6A94797" ma:contentTypeVersion="14" ma:contentTypeDescription="Create a new document." ma:contentTypeScope="" ma:versionID="d6544c7279bfc4708c848899dcaa8fdb">
   <xsd:schema xmlns:xsd="http://www.w3.org/2001/XMLSchema" xmlns:xs="http://www.w3.org/2001/XMLSchema" xmlns:p="http://schemas.microsoft.com/office/2006/metadata/properties" xmlns:ns2="f62b9ad8-a28f-4257-b39c-24ee014a67bd" targetNamespace="http://schemas.microsoft.com/office/2006/metadata/properties" ma:root="true" ma:fieldsID="c13e37bd38289dfcccadeff979405649" ns2:_="">
     <xsd:import namespace="f62b9ad8-a28f-4257-b39c-24ee014a67bd"/>
@@ -14579,28 +14737,25 @@
 </ct:contentTypeSchema>
 </file>
 
-<file path=customXml/item2.xml><?xml version="1.0" encoding="utf-8"?>
-<p:properties xmlns:p="http://schemas.microsoft.com/office/2006/metadata/properties" xmlns:xsi="http://www.w3.org/2001/XMLSchema-instance" xmlns:pc="http://schemas.microsoft.com/office/infopath/2007/PartnerControls">
-  <documentManagement>
-    <Year xmlns="f62b9ad8-a28f-4257-b39c-24ee014a67bd">2014</Year>
-    <Product xmlns="f62b9ad8-a28f-4257-b39c-24ee014a67bd" xsi:nil="true"/>
-    <Release xmlns="f62b9ad8-a28f-4257-b39c-24ee014a67bd" xsi:nil="true"/>
-    <Family xmlns="f62b9ad8-a28f-4257-b39c-24ee014a67bd" xsi:nil="true"/>
-    <Doc_x0020_Type xmlns="f62b9ad8-a28f-4257-b39c-24ee014a67bd" xsi:nil="true"/>
-  </documentManagement>
-</p:properties>
+<file path=customXml/itemProps1.xml><?xml version="1.0" encoding="utf-8"?>
+<ds:datastoreItem xmlns:ds="http://schemas.openxmlformats.org/officeDocument/2006/customXml" ds:itemID="{DF969D3E-2A43-4875-BB4D-F53FBF857244}">
+  <ds:schemaRefs>
+    <ds:schemaRef ds:uri="http://schemas.microsoft.com/sharepoint/v3/contenttype/forms"/>
+  </ds:schemaRefs>
+</ds:datastoreItem>
 </file>
 
-<file path=customXml/item3.xml><?xml version="1.0" encoding="utf-8"?>
-<?mso-contentType ?>
-<FormTemplates xmlns="http://schemas.microsoft.com/sharepoint/v3/contenttype/forms">
-  <Display>DocumentLibraryForm</Display>
-  <Edit>DocumentLibraryForm</Edit>
-  <New>DocumentLibraryForm</New>
-</FormTemplates>
+<file path=customXml/itemProps2.xml><?xml version="1.0" encoding="utf-8"?>
+<ds:datastoreItem xmlns:ds="http://schemas.openxmlformats.org/officeDocument/2006/customXml" ds:itemID="{22FDF740-02CD-4136-B2DA-BE81CB99FB50}">
+  <ds:schemaRefs>
+    <ds:schemaRef ds:uri="http://schemas.microsoft.com/office/2006/metadata/properties"/>
+    <ds:schemaRef ds:uri="http://schemas.microsoft.com/office/infopath/2007/PartnerControls"/>
+    <ds:schemaRef ds:uri="f62b9ad8-a28f-4257-b39c-24ee014a67bd"/>
+  </ds:schemaRefs>
+</ds:datastoreItem>
 </file>
 
-<file path=customXml/itemProps1.xml><?xml version="1.0" encoding="utf-8"?>
+<file path=customXml/itemProps3.xml><?xml version="1.0" encoding="utf-8"?>
 <ds:datastoreItem xmlns:ds="http://schemas.openxmlformats.org/officeDocument/2006/customXml" ds:itemID="{4B7D757E-6E9F-438F-91D0-6F9430C407B3}">
   <ds:schemaRefs>
     <ds:schemaRef ds:uri="http://schemas.microsoft.com/office/2006/metadata/contentType"/>
@@ -14616,22 +14771,4 @@
     <ds:schemaRef ds:uri="http://schemas.microsoft.com/internal/obd"/>
   </ds:schemaRefs>
 </ds:datastoreItem>
-</file>
-
-<file path=customXml/itemProps2.xml><?xml version="1.0" encoding="utf-8"?>
-<ds:datastoreItem xmlns:ds="http://schemas.openxmlformats.org/officeDocument/2006/customXml" ds:itemID="{22FDF740-02CD-4136-B2DA-BE81CB99FB50}">
-  <ds:schemaRefs>
-    <ds:schemaRef ds:uri="http://schemas.microsoft.com/office/2006/metadata/properties"/>
-    <ds:schemaRef ds:uri="http://schemas.microsoft.com/office/infopath/2007/PartnerControls"/>
-    <ds:schemaRef ds:uri="f62b9ad8-a28f-4257-b39c-24ee014a67bd"/>
-  </ds:schemaRefs>
-</ds:datastoreItem>
-</file>
-
-<file path=customXml/itemProps3.xml><?xml version="1.0" encoding="utf-8"?>
-<ds:datastoreItem xmlns:ds="http://schemas.openxmlformats.org/officeDocument/2006/customXml" ds:itemID="{DF969D3E-2A43-4875-BB4D-F53FBF857244}">
-  <ds:schemaRefs>
-    <ds:schemaRef ds:uri="http://schemas.microsoft.com/sharepoint/v3/contenttype/forms"/>
-  </ds:schemaRefs>
-</ds:datastoreItem>
 </file>
</xml_diff>